<commit_message>
add first video content
</commit_message>
<xml_diff>
--- a/video/Intro/videoslides.pptx
+++ b/video/Intro/videoslides.pptx
@@ -210,7 +210,7 @@
           <a:p>
             <a:fld id="{EDB5F8D5-7A7A-4D8A-940E-E4D306A22F78}" type="datetimeFigureOut">
               <a:rPr lang="nl-NL" smtClean="0"/>
-              <a:t>17-11-2021</a:t>
+              <a:t>19-11-2021</a:t>
             </a:fld>
             <a:endParaRPr lang="nl-NL"/>
           </a:p>
@@ -624,7 +624,7 @@
           <a:p>
             <a:fld id="{02F50C50-9308-4359-A91C-D9F23E8CBA2E}" type="datetimeFigureOut">
               <a:rPr lang="nl-NL" smtClean="0"/>
-              <a:t>17-11-2021</a:t>
+              <a:t>19-11-2021</a:t>
             </a:fld>
             <a:endParaRPr lang="nl-NL"/>
           </a:p>
@@ -822,7 +822,7 @@
           <a:p>
             <a:fld id="{02F50C50-9308-4359-A91C-D9F23E8CBA2E}" type="datetimeFigureOut">
               <a:rPr lang="nl-NL" smtClean="0"/>
-              <a:t>17-11-2021</a:t>
+              <a:t>19-11-2021</a:t>
             </a:fld>
             <a:endParaRPr lang="nl-NL"/>
           </a:p>
@@ -1030,7 +1030,7 @@
           <a:p>
             <a:fld id="{02F50C50-9308-4359-A91C-D9F23E8CBA2E}" type="datetimeFigureOut">
               <a:rPr lang="nl-NL" smtClean="0"/>
-              <a:t>17-11-2021</a:t>
+              <a:t>19-11-2021</a:t>
             </a:fld>
             <a:endParaRPr lang="nl-NL"/>
           </a:p>
@@ -1228,7 +1228,7 @@
           <a:p>
             <a:fld id="{02F50C50-9308-4359-A91C-D9F23E8CBA2E}" type="datetimeFigureOut">
               <a:rPr lang="nl-NL" smtClean="0"/>
-              <a:t>17-11-2021</a:t>
+              <a:t>19-11-2021</a:t>
             </a:fld>
             <a:endParaRPr lang="nl-NL"/>
           </a:p>
@@ -1503,7 +1503,7 @@
           <a:p>
             <a:fld id="{02F50C50-9308-4359-A91C-D9F23E8CBA2E}" type="datetimeFigureOut">
               <a:rPr lang="nl-NL" smtClean="0"/>
-              <a:t>17-11-2021</a:t>
+              <a:t>19-11-2021</a:t>
             </a:fld>
             <a:endParaRPr lang="nl-NL"/>
           </a:p>
@@ -1768,7 +1768,7 @@
           <a:p>
             <a:fld id="{02F50C50-9308-4359-A91C-D9F23E8CBA2E}" type="datetimeFigureOut">
               <a:rPr lang="nl-NL" smtClean="0"/>
-              <a:t>17-11-2021</a:t>
+              <a:t>19-11-2021</a:t>
             </a:fld>
             <a:endParaRPr lang="nl-NL"/>
           </a:p>
@@ -2180,7 +2180,7 @@
           <a:p>
             <a:fld id="{02F50C50-9308-4359-A91C-D9F23E8CBA2E}" type="datetimeFigureOut">
               <a:rPr lang="nl-NL" smtClean="0"/>
-              <a:t>17-11-2021</a:t>
+              <a:t>19-11-2021</a:t>
             </a:fld>
             <a:endParaRPr lang="nl-NL"/>
           </a:p>
@@ -2321,7 +2321,7 @@
           <a:p>
             <a:fld id="{02F50C50-9308-4359-A91C-D9F23E8CBA2E}" type="datetimeFigureOut">
               <a:rPr lang="nl-NL" smtClean="0"/>
-              <a:t>17-11-2021</a:t>
+              <a:t>19-11-2021</a:t>
             </a:fld>
             <a:endParaRPr lang="nl-NL"/>
           </a:p>
@@ -2434,7 +2434,7 @@
           <a:p>
             <a:fld id="{02F50C50-9308-4359-A91C-D9F23E8CBA2E}" type="datetimeFigureOut">
               <a:rPr lang="nl-NL" smtClean="0"/>
-              <a:t>17-11-2021</a:t>
+              <a:t>19-11-2021</a:t>
             </a:fld>
             <a:endParaRPr lang="nl-NL"/>
           </a:p>
@@ -2745,7 +2745,7 @@
           <a:p>
             <a:fld id="{02F50C50-9308-4359-A91C-D9F23E8CBA2E}" type="datetimeFigureOut">
               <a:rPr lang="nl-NL" smtClean="0"/>
-              <a:t>17-11-2021</a:t>
+              <a:t>19-11-2021</a:t>
             </a:fld>
             <a:endParaRPr lang="nl-NL"/>
           </a:p>
@@ -3033,7 +3033,7 @@
           <a:p>
             <a:fld id="{02F50C50-9308-4359-A91C-D9F23E8CBA2E}" type="datetimeFigureOut">
               <a:rPr lang="nl-NL" smtClean="0"/>
-              <a:t>17-11-2021</a:t>
+              <a:t>19-11-2021</a:t>
             </a:fld>
             <a:endParaRPr lang="nl-NL"/>
           </a:p>
@@ -3274,7 +3274,7 @@
           <a:p>
             <a:fld id="{02F50C50-9308-4359-A91C-D9F23E8CBA2E}" type="datetimeFigureOut">
               <a:rPr lang="nl-NL" smtClean="0"/>
-              <a:t>17-11-2021</a:t>
+              <a:t>19-11-2021</a:t>
             </a:fld>
             <a:endParaRPr lang="nl-NL"/>
           </a:p>
@@ -3739,12 +3739,12 @@
   </p:clrMapOvr>
   <mc:AlternateContent xmlns:mc="http://schemas.openxmlformats.org/markup-compatibility/2006">
     <mc:Choice xmlns:p14="http://schemas.microsoft.com/office/powerpoint/2010/main" Requires="p14">
-      <p:transition spd="slow" p14:dur="3400" advClick="0" advTm="0">
+      <p:transition spd="slow" p14:dur="3400" advClick="0" advTm="1000">
         <p14:reveal/>
       </p:transition>
     </mc:Choice>
     <mc:Fallback>
-      <p:transition spd="slow" advClick="0" advTm="0">
+      <p:transition spd="slow" advClick="0" advTm="1000">
         <p:fade/>
       </p:transition>
     </mc:Fallback>
@@ -3815,13 +3815,13 @@
   <p:clrMapOvr>
     <a:masterClrMapping/>
   </p:clrMapOvr>
-  <mc:AlternateContent xmlns:mc="http://schemas.openxmlformats.org/markup-compatibility/2006">
-    <mc:Choice xmlns:p159="http://schemas.microsoft.com/office/powerpoint/2015/09/main" Requires="p159">
+  <mc:AlternateContent xmlns:mc="http://schemas.openxmlformats.org/markup-compatibility/2006" xmlns:p159="http://schemas.microsoft.com/office/powerpoint/2015/09/main">
+    <mc:Choice Requires="p159">
       <p:transition xmlns:p14="http://schemas.microsoft.com/office/powerpoint/2010/main" spd="slow" p14:dur="2000" advClick="0" advTm="0">
         <p159:morph option="byObject"/>
       </p:transition>
     </mc:Choice>
-    <mc:Fallback>
+    <mc:Fallback xmlns="">
       <p:transition spd="slow" advClick="0" advTm="0">
         <p:fade/>
       </p:transition>
@@ -4054,13 +4054,13 @@
   <p:clrMapOvr>
     <a:masterClrMapping/>
   </p:clrMapOvr>
-  <mc:AlternateContent xmlns:mc="http://schemas.openxmlformats.org/markup-compatibility/2006">
-    <mc:Choice xmlns:p14="http://schemas.microsoft.com/office/powerpoint/2010/main" Requires="p14">
+  <mc:AlternateContent xmlns:mc="http://schemas.openxmlformats.org/markup-compatibility/2006" xmlns:p14="http://schemas.microsoft.com/office/powerpoint/2010/main">
+    <mc:Choice Requires="p14">
       <p:transition spd="med" p14:dur="700">
         <p:fade/>
       </p:transition>
     </mc:Choice>
-    <mc:Fallback>
+    <mc:Fallback xmlns="">
       <p:transition spd="med">
         <p:fade/>
       </p:transition>

</xml_diff>